<commit_message>
fixed table of contents
</commit_message>
<xml_diff>
--- a/CS-6223/hw/Grad_Project/Final Documents/PrivKV Differential Privacy for Key Value Structured Data.pptx
+++ b/CS-6223/hw/Grad_Project/Final Documents/PrivKV Differential Privacy for Key Value Structured Data.pptx
@@ -5375,8 +5375,8 @@
           </a:p>
         </p:txBody>
       </p:sp>
-      <mc:AlternateContent xmlns:mc="http://schemas.openxmlformats.org/markup-compatibility/2006">
-        <mc:Choice xmlns:a14="http://schemas.microsoft.com/office/drawing/2010/main" Requires="a14">
+      <mc:AlternateContent xmlns:mc="http://schemas.openxmlformats.org/markup-compatibility/2006" xmlns:a14="http://schemas.microsoft.com/office/drawing/2010/main">
+        <mc:Choice Requires="a14">
           <p:sp>
             <p:nvSpPr>
               <p:cNvPr id="7" name="TextBox 6">
@@ -5653,7 +5653,7 @@
             </p:txBody>
           </p:sp>
         </mc:Choice>
-        <mc:Fallback>
+        <mc:Fallback xmlns="">
           <p:sp>
             <p:nvSpPr>
               <p:cNvPr id="7" name="TextBox 6">
@@ -6709,8 +6709,8 @@
           </a:p>
         </p:txBody>
       </p:sp>
-      <mc:AlternateContent xmlns:mc="http://schemas.openxmlformats.org/markup-compatibility/2006">
-        <mc:Choice xmlns:a14="http://schemas.microsoft.com/office/drawing/2010/main" Requires="a14">
+      <mc:AlternateContent xmlns:mc="http://schemas.openxmlformats.org/markup-compatibility/2006" xmlns:a14="http://schemas.microsoft.com/office/drawing/2010/main">
+        <mc:Choice Requires="a14">
           <p:sp>
             <p:nvSpPr>
               <p:cNvPr id="3" name="Content Placeholder 2">
@@ -6788,7 +6788,7 @@
             </p:txBody>
           </p:sp>
         </mc:Choice>
-        <mc:Fallback>
+        <mc:Fallback xmlns="">
           <p:sp>
             <p:nvSpPr>
               <p:cNvPr id="3" name="Content Placeholder 2">
@@ -7901,6 +7901,20 @@
               <a:rPr lang="en-US" dirty="0"/>
               <a:t>Key-Value Protocols</a:t>
             </a:r>
+          </a:p>
+          <a:p>
+            <a:r>
+              <a:rPr lang="en-US" dirty="0" err="1"/>
+              <a:t>PrivKV</a:t>
+            </a:r>
+            <a:endParaRPr lang="en-US" dirty="0"/>
+          </a:p>
+          <a:p>
+            <a:r>
+              <a:rPr lang="en-US"/>
+              <a:t>Experiments</a:t>
+            </a:r>
+            <a:endParaRPr lang="en-US" dirty="0"/>
           </a:p>
           <a:p>
             <a:endParaRPr lang="en-US" dirty="0"/>
@@ -9140,8 +9154,8 @@
           </a:p>
         </p:txBody>
       </p:sp>
-      <mc:AlternateContent xmlns:mc="http://schemas.openxmlformats.org/markup-compatibility/2006">
-        <mc:Choice xmlns:a14="http://schemas.microsoft.com/office/drawing/2010/main" Requires="a14">
+      <mc:AlternateContent xmlns:mc="http://schemas.openxmlformats.org/markup-compatibility/2006" xmlns:a14="http://schemas.microsoft.com/office/drawing/2010/main">
+        <mc:Choice Requires="a14">
           <p:sp>
             <p:nvSpPr>
               <p:cNvPr id="3" name="Content Placeholder 2">
@@ -9699,7 +9713,7 @@
             </p:txBody>
           </p:sp>
         </mc:Choice>
-        <mc:Fallback>
+        <mc:Fallback xmlns="">
           <p:sp>
             <p:nvSpPr>
               <p:cNvPr id="3" name="Content Placeholder 2">
@@ -9764,8 +9778,8 @@
           </a:p>
         </p:txBody>
       </p:sp>
-      <mc:AlternateContent xmlns:mc="http://schemas.openxmlformats.org/markup-compatibility/2006">
-        <mc:Choice xmlns:a14="http://schemas.microsoft.com/office/drawing/2010/main" Requires="a14">
+      <mc:AlternateContent xmlns:mc="http://schemas.openxmlformats.org/markup-compatibility/2006" xmlns:a14="http://schemas.microsoft.com/office/drawing/2010/main">
+        <mc:Choice Requires="a14">
           <p:sp>
             <p:nvSpPr>
               <p:cNvPr id="7" name="TextBox 6">
@@ -10048,7 +10062,7 @@
             </p:txBody>
           </p:sp>
         </mc:Choice>
-        <mc:Fallback>
+        <mc:Fallback xmlns="">
           <p:sp>
             <p:nvSpPr>
               <p:cNvPr id="7" name="TextBox 6">
@@ -10151,8 +10165,8 @@
           </a:p>
         </p:txBody>
       </p:sp>
-      <mc:AlternateContent xmlns:mc="http://schemas.openxmlformats.org/markup-compatibility/2006">
-        <mc:Choice xmlns:a14="http://schemas.microsoft.com/office/drawing/2010/main" Requires="a14">
+      <mc:AlternateContent xmlns:mc="http://schemas.openxmlformats.org/markup-compatibility/2006" xmlns:a14="http://schemas.microsoft.com/office/drawing/2010/main">
+        <mc:Choice Requires="a14">
           <p:sp>
             <p:nvSpPr>
               <p:cNvPr id="3" name="Content Placeholder 2">
@@ -10298,7 +10312,7 @@
             </p:txBody>
           </p:sp>
         </mc:Choice>
-        <mc:Fallback>
+        <mc:Fallback xmlns="">
           <p:sp>
             <p:nvSpPr>
               <p:cNvPr id="3" name="Content Placeholder 2">
@@ -10781,8 +10795,8 @@
           </a:p>
         </p:txBody>
       </p:sp>
-      <mc:AlternateContent xmlns:mc="http://schemas.openxmlformats.org/markup-compatibility/2006">
-        <mc:Choice xmlns:a14="http://schemas.microsoft.com/office/drawing/2010/main" Requires="a14">
+      <mc:AlternateContent xmlns:mc="http://schemas.openxmlformats.org/markup-compatibility/2006" xmlns:a14="http://schemas.microsoft.com/office/drawing/2010/main">
+        <mc:Choice Requires="a14">
           <p:sp>
             <p:nvSpPr>
               <p:cNvPr id="5" name="TextBox 4">
@@ -10922,7 +10936,7 @@
             </p:txBody>
           </p:sp>
         </mc:Choice>
-        <mc:Fallback>
+        <mc:Fallback xmlns="">
           <p:sp>
             <p:nvSpPr>
               <p:cNvPr id="5" name="TextBox 4">
@@ -10972,8 +10986,8 @@
           </p:sp>
         </mc:Fallback>
       </mc:AlternateContent>
-      <mc:AlternateContent xmlns:mc="http://schemas.openxmlformats.org/markup-compatibility/2006">
-        <mc:Choice xmlns:a14="http://schemas.microsoft.com/office/drawing/2010/main" Requires="a14">
+      <mc:AlternateContent xmlns:mc="http://schemas.openxmlformats.org/markup-compatibility/2006" xmlns:a14="http://schemas.microsoft.com/office/drawing/2010/main">
+        <mc:Choice Requires="a14">
           <p:sp>
             <p:nvSpPr>
               <p:cNvPr id="6" name="TextBox 5">
@@ -11105,7 +11119,7 @@
             </p:txBody>
           </p:sp>
         </mc:Choice>
-        <mc:Fallback>
+        <mc:Fallback xmlns="">
           <p:sp>
             <p:nvSpPr>
               <p:cNvPr id="6" name="TextBox 5">
@@ -11213,8 +11227,8 @@
           </a:p>
         </p:txBody>
       </p:sp>
-      <mc:AlternateContent xmlns:mc="http://schemas.openxmlformats.org/markup-compatibility/2006">
-        <mc:Choice xmlns:a14="http://schemas.microsoft.com/office/drawing/2010/main" Requires="a14">
+      <mc:AlternateContent xmlns:mc="http://schemas.openxmlformats.org/markup-compatibility/2006" xmlns:a14="http://schemas.microsoft.com/office/drawing/2010/main">
+        <mc:Choice Requires="a14">
           <p:sp>
             <p:nvSpPr>
               <p:cNvPr id="3" name="Content Placeholder 2">
@@ -11581,7 +11595,7 @@
             </p:txBody>
           </p:sp>
         </mc:Choice>
-        <mc:Fallback>
+        <mc:Fallback xmlns="">
           <p:sp>
             <p:nvSpPr>
               <p:cNvPr id="3" name="Content Placeholder 2">
@@ -11646,8 +11660,8 @@
           </a:p>
         </p:txBody>
       </p:sp>
-      <mc:AlternateContent xmlns:mc="http://schemas.openxmlformats.org/markup-compatibility/2006">
-        <mc:Choice xmlns:a14="http://schemas.microsoft.com/office/drawing/2010/main" Requires="a14">
+      <mc:AlternateContent xmlns:mc="http://schemas.openxmlformats.org/markup-compatibility/2006" xmlns:a14="http://schemas.microsoft.com/office/drawing/2010/main">
+        <mc:Choice Requires="a14">
           <p:sp>
             <p:nvSpPr>
               <p:cNvPr id="5" name="TextBox 4">
@@ -11875,7 +11889,7 @@
             </p:txBody>
           </p:sp>
         </mc:Choice>
-        <mc:Fallback>
+        <mc:Fallback xmlns="">
           <p:sp>
             <p:nvSpPr>
               <p:cNvPr id="5" name="TextBox 4">
@@ -11925,8 +11939,8 @@
           </p:sp>
         </mc:Fallback>
       </mc:AlternateContent>
-      <mc:AlternateContent xmlns:mc="http://schemas.openxmlformats.org/markup-compatibility/2006">
-        <mc:Choice xmlns:a14="http://schemas.microsoft.com/office/drawing/2010/main" Requires="a14">
+      <mc:AlternateContent xmlns:mc="http://schemas.openxmlformats.org/markup-compatibility/2006" xmlns:a14="http://schemas.microsoft.com/office/drawing/2010/main">
+        <mc:Choice Requires="a14">
           <p:sp>
             <p:nvSpPr>
               <p:cNvPr id="6" name="TextBox 5">
@@ -12214,7 +12228,7 @@
             </p:txBody>
           </p:sp>
         </mc:Choice>
-        <mc:Fallback>
+        <mc:Fallback xmlns="">
           <p:sp>
             <p:nvSpPr>
               <p:cNvPr id="6" name="TextBox 5">
@@ -12264,8 +12278,8 @@
           </p:sp>
         </mc:Fallback>
       </mc:AlternateContent>
-      <mc:AlternateContent xmlns:mc="http://schemas.openxmlformats.org/markup-compatibility/2006">
-        <mc:Choice xmlns:a14="http://schemas.microsoft.com/office/drawing/2010/main" Requires="a14">
+      <mc:AlternateContent xmlns:mc="http://schemas.openxmlformats.org/markup-compatibility/2006" xmlns:a14="http://schemas.microsoft.com/office/drawing/2010/main">
+        <mc:Choice Requires="a14">
           <p:sp>
             <p:nvSpPr>
               <p:cNvPr id="7" name="TextBox 6">
@@ -12299,6 +12313,7 @@
               </a:bodyPr>
               <a:lstStyle/>
               <a:p>
+                <a:pPr/>
                 <a14:m>
                   <m:oMathPara xmlns:m="http://schemas.openxmlformats.org/officeDocument/2006/math">
                     <m:oMathParaPr>
@@ -12484,7 +12499,7 @@
             </p:txBody>
           </p:sp>
         </mc:Choice>
-        <mc:Fallback>
+        <mc:Fallback xmlns="">
           <p:sp>
             <p:nvSpPr>
               <p:cNvPr id="7" name="TextBox 6">

</xml_diff>